<commit_message>
aangepast kijk ff laatste sheet
</commit_message>
<xml_diff>
--- a/Verslaglegging/CHAP_orgineel.pptx
+++ b/Verslaglegging/CHAP_orgineel.pptx
@@ -302,7 +302,7 @@
           <a:p>
             <a:fld id="{49183307-3DA1-4D05-9E8D-D4B482F8A186}" type="datetimeFigureOut">
               <a:rPr lang="nl-NL" smtClean="0"/>
-              <a:t>2-10-2013</a:t>
+              <a:t>3-10-2013</a:t>
             </a:fld>
             <a:endParaRPr lang="nl-NL"/>
           </a:p>
@@ -467,7 +467,7 @@
           <a:p>
             <a:fld id="{49183307-3DA1-4D05-9E8D-D4B482F8A186}" type="datetimeFigureOut">
               <a:rPr lang="nl-NL" smtClean="0"/>
-              <a:t>2-10-2013</a:t>
+              <a:t>3-10-2013</a:t>
             </a:fld>
             <a:endParaRPr lang="nl-NL"/>
           </a:p>
@@ -642,7 +642,7 @@
           <a:p>
             <a:fld id="{49183307-3DA1-4D05-9E8D-D4B482F8A186}" type="datetimeFigureOut">
               <a:rPr lang="nl-NL" smtClean="0"/>
-              <a:t>2-10-2013</a:t>
+              <a:t>3-10-2013</a:t>
             </a:fld>
             <a:endParaRPr lang="nl-NL"/>
           </a:p>
@@ -825,7 +825,7 @@
           <a:p>
             <a:fld id="{49183307-3DA1-4D05-9E8D-D4B482F8A186}" type="datetimeFigureOut">
               <a:rPr lang="nl-NL" smtClean="0"/>
-              <a:t>2-10-2013</a:t>
+              <a:t>3-10-2013</a:t>
             </a:fld>
             <a:endParaRPr lang="nl-NL"/>
           </a:p>
@@ -1087,7 +1087,7 @@
           <a:p>
             <a:fld id="{49183307-3DA1-4D05-9E8D-D4B482F8A186}" type="datetimeFigureOut">
               <a:rPr lang="nl-NL" smtClean="0"/>
-              <a:t>2-10-2013</a:t>
+              <a:t>3-10-2013</a:t>
             </a:fld>
             <a:endParaRPr lang="nl-NL"/>
           </a:p>
@@ -1435,7 +1435,7 @@
           <a:p>
             <a:fld id="{49183307-3DA1-4D05-9E8D-D4B482F8A186}" type="datetimeFigureOut">
               <a:rPr lang="nl-NL" smtClean="0"/>
-              <a:t>2-10-2013</a:t>
+              <a:t>3-10-2013</a:t>
             </a:fld>
             <a:endParaRPr lang="nl-NL"/>
           </a:p>
@@ -1743,7 +1743,7 @@
           <a:p>
             <a:fld id="{49183307-3DA1-4D05-9E8D-D4B482F8A186}" type="datetimeFigureOut">
               <a:rPr lang="nl-NL" smtClean="0"/>
-              <a:t>2-10-2013</a:t>
+              <a:t>3-10-2013</a:t>
             </a:fld>
             <a:endParaRPr lang="nl-NL"/>
           </a:p>
@@ -1970,7 +1970,7 @@
           <a:p>
             <a:fld id="{49183307-3DA1-4D05-9E8D-D4B482F8A186}" type="datetimeFigureOut">
               <a:rPr lang="nl-NL" smtClean="0"/>
-              <a:t>2-10-2013</a:t>
+              <a:t>3-10-2013</a:t>
             </a:fld>
             <a:endParaRPr lang="nl-NL"/>
           </a:p>
@@ -2060,7 +2060,7 @@
           <a:p>
             <a:fld id="{49183307-3DA1-4D05-9E8D-D4B482F8A186}" type="datetimeFigureOut">
               <a:rPr lang="nl-NL" smtClean="0"/>
-              <a:t>2-10-2013</a:t>
+              <a:t>3-10-2013</a:t>
             </a:fld>
             <a:endParaRPr lang="nl-NL"/>
           </a:p>
@@ -2348,7 +2348,7 @@
           <a:p>
             <a:fld id="{49183307-3DA1-4D05-9E8D-D4B482F8A186}" type="datetimeFigureOut">
               <a:rPr lang="nl-NL" smtClean="0"/>
-              <a:t>2-10-2013</a:t>
+              <a:t>3-10-2013</a:t>
             </a:fld>
             <a:endParaRPr lang="nl-NL"/>
           </a:p>
@@ -2617,7 +2617,7 @@
           <a:p>
             <a:fld id="{49183307-3DA1-4D05-9E8D-D4B482F8A186}" type="datetimeFigureOut">
               <a:rPr lang="nl-NL" smtClean="0"/>
-              <a:t>2-10-2013</a:t>
+              <a:t>3-10-2013</a:t>
             </a:fld>
             <a:endParaRPr lang="nl-NL"/>
           </a:p>
@@ -2827,7 +2827,7 @@
           <a:p>
             <a:fld id="{49183307-3DA1-4D05-9E8D-D4B482F8A186}" type="datetimeFigureOut">
               <a:rPr lang="nl-NL" smtClean="0"/>
-              <a:t>2-10-2013</a:t>
+              <a:t>3-10-2013</a:t>
             </a:fld>
             <a:endParaRPr lang="nl-NL"/>
           </a:p>
@@ -3819,13 +3819,41 @@
           <a:p>
             <a:r>
               <a:rPr lang="nl-NL" dirty="0" smtClean="0"/>
-              <a:t>David in </a:t>
-            </a:r>
-            <a:r>
-              <a:rPr lang="nl-NL" dirty="0" err="1" smtClean="0"/>
-              <a:t>robotpak</a:t>
-            </a:r>
+              <a:t>CHAP rijd staande flesje om , en pakt liggende flesjes op met behulp van een loopband in het midden.</a:t>
+            </a:r>
+          </a:p>
+          <a:p>
             <a:endParaRPr lang="nl-NL" dirty="0"/>
+          </a:p>
+          <a:p>
+            <a:r>
+              <a:rPr lang="nl-NL" dirty="0" smtClean="0"/>
+              <a:t>Camera en raspberry pi voor positionering.</a:t>
+            </a:r>
+            <a:endParaRPr lang="nl-NL" dirty="0"/>
+          </a:p>
+          <a:p>
+            <a:endParaRPr lang="nl-NL" dirty="0"/>
+          </a:p>
+          <a:p>
+            <a:r>
+              <a:rPr lang="nl-NL" dirty="0" smtClean="0"/>
+              <a:t>Krat controleren en vullen met arm </a:t>
+            </a:r>
+            <a:r>
+              <a:rPr lang="nl-NL" smtClean="0"/>
+              <a:t>bestuurd m.b.v. </a:t>
+            </a:r>
+            <a:r>
+              <a:rPr lang="nl-NL" dirty="0" smtClean="0"/>
+              <a:t>arduino.</a:t>
+            </a:r>
+          </a:p>
+          <a:p>
+            <a:endParaRPr lang="nl-NL" dirty="0"/>
+          </a:p>
+          <a:p>
+            <a:endParaRPr lang="nl-NL" dirty="0" smtClean="0"/>
           </a:p>
         </p:txBody>
       </p:sp>

</xml_diff>